<commit_message>
add docker image pull
</commit_message>
<xml_diff>
--- a/sample/kubernetes/Bring your own device - Vorbereitung.pptx
+++ b/sample/kubernetes/Bring your own device - Vorbereitung.pptx
@@ -204,7 +204,7 @@
           <a:p>
             <a:fld id="{5CCD219F-F703-C14B-A05B-DA5DAB0DC4D2}" type="datetimeFigureOut">
               <a:rPr lang="de-DE" smtClean="0"/>
-              <a:t>28.02.23</a:t>
+              <a:t>03.03.23</a:t>
             </a:fld>
             <a:endParaRPr lang="de-DE"/>
           </a:p>
@@ -702,7 +702,7 @@
           <a:p>
             <a:fld id="{6B40B35D-B481-DF4E-B1B0-2B6288A3F72B}" type="datetimeFigureOut">
               <a:rPr lang="de-DE" smtClean="0"/>
-              <a:t>28.02.23</a:t>
+              <a:t>03.03.23</a:t>
             </a:fld>
             <a:endParaRPr lang="de-DE"/>
           </a:p>
@@ -900,7 +900,7 @@
           <a:p>
             <a:fld id="{6B40B35D-B481-DF4E-B1B0-2B6288A3F72B}" type="datetimeFigureOut">
               <a:rPr lang="de-DE" smtClean="0"/>
-              <a:t>28.02.23</a:t>
+              <a:t>03.03.23</a:t>
             </a:fld>
             <a:endParaRPr lang="de-DE"/>
           </a:p>
@@ -1108,7 +1108,7 @@
           <a:p>
             <a:fld id="{6B40B35D-B481-DF4E-B1B0-2B6288A3F72B}" type="datetimeFigureOut">
               <a:rPr lang="de-DE" smtClean="0"/>
-              <a:t>28.02.23</a:t>
+              <a:t>03.03.23</a:t>
             </a:fld>
             <a:endParaRPr lang="de-DE"/>
           </a:p>
@@ -1306,7 +1306,7 @@
           <a:p>
             <a:fld id="{6B40B35D-B481-DF4E-B1B0-2B6288A3F72B}" type="datetimeFigureOut">
               <a:rPr lang="de-DE" smtClean="0"/>
-              <a:t>28.02.23</a:t>
+              <a:t>03.03.23</a:t>
             </a:fld>
             <a:endParaRPr lang="de-DE"/>
           </a:p>
@@ -1581,7 +1581,7 @@
           <a:p>
             <a:fld id="{6B40B35D-B481-DF4E-B1B0-2B6288A3F72B}" type="datetimeFigureOut">
               <a:rPr lang="de-DE" smtClean="0"/>
-              <a:t>28.02.23</a:t>
+              <a:t>03.03.23</a:t>
             </a:fld>
             <a:endParaRPr lang="de-DE"/>
           </a:p>
@@ -1846,7 +1846,7 @@
           <a:p>
             <a:fld id="{6B40B35D-B481-DF4E-B1B0-2B6288A3F72B}" type="datetimeFigureOut">
               <a:rPr lang="de-DE" smtClean="0"/>
-              <a:t>28.02.23</a:t>
+              <a:t>03.03.23</a:t>
             </a:fld>
             <a:endParaRPr lang="de-DE"/>
           </a:p>
@@ -2258,7 +2258,7 @@
           <a:p>
             <a:fld id="{6B40B35D-B481-DF4E-B1B0-2B6288A3F72B}" type="datetimeFigureOut">
               <a:rPr lang="de-DE" smtClean="0"/>
-              <a:t>28.02.23</a:t>
+              <a:t>03.03.23</a:t>
             </a:fld>
             <a:endParaRPr lang="de-DE"/>
           </a:p>
@@ -2399,7 +2399,7 @@
           <a:p>
             <a:fld id="{6B40B35D-B481-DF4E-B1B0-2B6288A3F72B}" type="datetimeFigureOut">
               <a:rPr lang="de-DE" smtClean="0"/>
-              <a:t>28.02.23</a:t>
+              <a:t>03.03.23</a:t>
             </a:fld>
             <a:endParaRPr lang="de-DE"/>
           </a:p>
@@ -2512,7 +2512,7 @@
           <a:p>
             <a:fld id="{6B40B35D-B481-DF4E-B1B0-2B6288A3F72B}" type="datetimeFigureOut">
               <a:rPr lang="de-DE" smtClean="0"/>
-              <a:t>28.02.23</a:t>
+              <a:t>03.03.23</a:t>
             </a:fld>
             <a:endParaRPr lang="de-DE"/>
           </a:p>
@@ -2823,7 +2823,7 @@
           <a:p>
             <a:fld id="{6B40B35D-B481-DF4E-B1B0-2B6288A3F72B}" type="datetimeFigureOut">
               <a:rPr lang="de-DE" smtClean="0"/>
-              <a:t>28.02.23</a:t>
+              <a:t>03.03.23</a:t>
             </a:fld>
             <a:endParaRPr lang="de-DE"/>
           </a:p>
@@ -3111,7 +3111,7 @@
           <a:p>
             <a:fld id="{6B40B35D-B481-DF4E-B1B0-2B6288A3F72B}" type="datetimeFigureOut">
               <a:rPr lang="de-DE" smtClean="0"/>
-              <a:t>28.02.23</a:t>
+              <a:t>03.03.23</a:t>
             </a:fld>
             <a:endParaRPr lang="de-DE"/>
           </a:p>
@@ -3352,7 +3352,7 @@
           <a:p>
             <a:fld id="{6B40B35D-B481-DF4E-B1B0-2B6288A3F72B}" type="datetimeFigureOut">
               <a:rPr lang="de-DE" smtClean="0"/>
-              <a:t>28.02.23</a:t>
+              <a:t>03.03.23</a:t>
             </a:fld>
             <a:endParaRPr lang="de-DE"/>
           </a:p>
@@ -4361,48 +4361,48 @@
               <a:buNone/>
             </a:pPr>
             <a:r>
-              <a:rPr lang="de-DE" dirty="0">
+              <a:rPr lang="de-DE" sz="1800" dirty="0">
                 <a:latin typeface="Courier New" panose="02070309020205020404" pitchFamily="49" charset="0"/>
                 <a:cs typeface="Courier New" panose="02070309020205020404" pitchFamily="49" charset="0"/>
               </a:rPr>
               <a:t>multipass launch --name </a:t>
             </a:r>
             <a:r>
-              <a:rPr lang="de-DE" dirty="0" err="1">
+              <a:rPr lang="de-DE" sz="1800" dirty="0" err="1">
                 <a:latin typeface="Courier New" panose="02070309020205020404" pitchFamily="49" charset="0"/>
                 <a:cs typeface="Courier New" panose="02070309020205020404" pitchFamily="49" charset="0"/>
               </a:rPr>
               <a:t>master</a:t>
             </a:r>
             <a:r>
-              <a:rPr lang="de-DE" dirty="0">
+              <a:rPr lang="de-DE" sz="1800" dirty="0">
                 <a:latin typeface="Courier New" panose="02070309020205020404" pitchFamily="49" charset="0"/>
                 <a:cs typeface="Courier New" panose="02070309020205020404" pitchFamily="49" charset="0"/>
               </a:rPr>
               <a:t> --</a:t>
             </a:r>
             <a:r>
-              <a:rPr lang="de-DE" dirty="0" err="1">
+              <a:rPr lang="de-DE" sz="1800" dirty="0" err="1">
                 <a:latin typeface="Courier New" panose="02070309020205020404" pitchFamily="49" charset="0"/>
                 <a:cs typeface="Courier New" panose="02070309020205020404" pitchFamily="49" charset="0"/>
               </a:rPr>
               <a:t>cpus</a:t>
             </a:r>
             <a:r>
-              <a:rPr lang="de-DE" dirty="0">
+              <a:rPr lang="de-DE" sz="1800" dirty="0">
                 <a:latin typeface="Courier New" panose="02070309020205020404" pitchFamily="49" charset="0"/>
                 <a:cs typeface="Courier New" panose="02070309020205020404" pitchFamily="49" charset="0"/>
               </a:rPr>
               <a:t> 2 --memory 4G --disk 20G </a:t>
             </a:r>
             <a:r>
-              <a:rPr lang="de-DE" dirty="0" err="1">
+              <a:rPr lang="de-DE" sz="1800" dirty="0" err="1">
                 <a:latin typeface="Courier New" panose="02070309020205020404" pitchFamily="49" charset="0"/>
                 <a:cs typeface="Courier New" panose="02070309020205020404" pitchFamily="49" charset="0"/>
               </a:rPr>
               <a:t>lts</a:t>
             </a:r>
-            <a:endParaRPr lang="de-DE" dirty="0">
+            <a:endParaRPr lang="de-DE" sz="1800" dirty="0">
               <a:latin typeface="Courier New" panose="02070309020205020404" pitchFamily="49" charset="0"/>
               <a:cs typeface="Courier New" panose="02070309020205020404" pitchFamily="49" charset="0"/>
             </a:endParaRPr>
@@ -4412,34 +4412,34 @@
               <a:buNone/>
             </a:pPr>
             <a:r>
-              <a:rPr lang="de-DE" dirty="0">
+              <a:rPr lang="de-DE" sz="1800" dirty="0">
                 <a:latin typeface="Courier New" panose="02070309020205020404" pitchFamily="49" charset="0"/>
                 <a:cs typeface="Courier New" panose="02070309020205020404" pitchFamily="49" charset="0"/>
               </a:rPr>
               <a:t>multipass launch --name worker1 --</a:t>
             </a:r>
             <a:r>
-              <a:rPr lang="de-DE" dirty="0" err="1">
+              <a:rPr lang="de-DE" sz="1800" dirty="0" err="1">
                 <a:latin typeface="Courier New" panose="02070309020205020404" pitchFamily="49" charset="0"/>
                 <a:cs typeface="Courier New" panose="02070309020205020404" pitchFamily="49" charset="0"/>
               </a:rPr>
               <a:t>cpus</a:t>
             </a:r>
             <a:r>
-              <a:rPr lang="de-DE" dirty="0">
+              <a:rPr lang="de-DE" sz="1800" dirty="0">
                 <a:latin typeface="Courier New" panose="02070309020205020404" pitchFamily="49" charset="0"/>
                 <a:cs typeface="Courier New" panose="02070309020205020404" pitchFamily="49" charset="0"/>
               </a:rPr>
               <a:t> 2 --memory 4G --disk 20G </a:t>
             </a:r>
             <a:r>
-              <a:rPr lang="de-DE" dirty="0" err="1">
+              <a:rPr lang="de-DE" sz="1800" dirty="0" err="1">
                 <a:latin typeface="Courier New" panose="02070309020205020404" pitchFamily="49" charset="0"/>
                 <a:cs typeface="Courier New" panose="02070309020205020404" pitchFamily="49" charset="0"/>
               </a:rPr>
               <a:t>lts</a:t>
             </a:r>
-            <a:endParaRPr lang="de-DE" dirty="0">
+            <a:endParaRPr lang="de-DE" sz="1800" dirty="0">
               <a:latin typeface="Courier New" panose="02070309020205020404" pitchFamily="49" charset="0"/>
               <a:cs typeface="Courier New" panose="02070309020205020404" pitchFamily="49" charset="0"/>
             </a:endParaRPr>
@@ -4449,34 +4449,34 @@
               <a:buNone/>
             </a:pPr>
             <a:r>
-              <a:rPr lang="de-DE" dirty="0">
+              <a:rPr lang="de-DE" sz="1800" dirty="0">
                 <a:latin typeface="Courier New" panose="02070309020205020404" pitchFamily="49" charset="0"/>
                 <a:cs typeface="Courier New" panose="02070309020205020404" pitchFamily="49" charset="0"/>
               </a:rPr>
               <a:t>multipass launch --name worker2 --</a:t>
             </a:r>
             <a:r>
-              <a:rPr lang="de-DE" dirty="0" err="1">
+              <a:rPr lang="de-DE" sz="1800" dirty="0" err="1">
                 <a:latin typeface="Courier New" panose="02070309020205020404" pitchFamily="49" charset="0"/>
                 <a:cs typeface="Courier New" panose="02070309020205020404" pitchFamily="49" charset="0"/>
               </a:rPr>
               <a:t>cpus</a:t>
             </a:r>
             <a:r>
-              <a:rPr lang="de-DE" dirty="0">
+              <a:rPr lang="de-DE" sz="1800" dirty="0">
                 <a:latin typeface="Courier New" panose="02070309020205020404" pitchFamily="49" charset="0"/>
                 <a:cs typeface="Courier New" panose="02070309020205020404" pitchFamily="49" charset="0"/>
               </a:rPr>
               <a:t> 2 --memory 4G --disk 20G </a:t>
             </a:r>
             <a:r>
-              <a:rPr lang="de-DE" dirty="0" err="1">
+              <a:rPr lang="de-DE" sz="1800" dirty="0" err="1">
                 <a:latin typeface="Courier New" panose="02070309020205020404" pitchFamily="49" charset="0"/>
                 <a:cs typeface="Courier New" panose="02070309020205020404" pitchFamily="49" charset="0"/>
               </a:rPr>
               <a:t>lts</a:t>
             </a:r>
-            <a:endParaRPr lang="de-DE" dirty="0">
+            <a:endParaRPr lang="de-DE" sz="1800" dirty="0">
               <a:latin typeface="Courier New" panose="02070309020205020404" pitchFamily="49" charset="0"/>
               <a:cs typeface="Courier New" panose="02070309020205020404" pitchFamily="49" charset="0"/>
             </a:endParaRPr>
@@ -4486,48 +4486,48 @@
               <a:buNone/>
             </a:pPr>
             <a:r>
-              <a:rPr lang="de-DE" dirty="0">
+              <a:rPr lang="de-DE" sz="1800" dirty="0">
                 <a:latin typeface="Courier New" panose="02070309020205020404" pitchFamily="49" charset="0"/>
                 <a:cs typeface="Courier New" panose="02070309020205020404" pitchFamily="49" charset="0"/>
               </a:rPr>
               <a:t>multipass launch --name </a:t>
             </a:r>
             <a:r>
-              <a:rPr lang="de-DE" dirty="0" err="1">
+              <a:rPr lang="de-DE" sz="1800" dirty="0" err="1">
                 <a:latin typeface="Courier New" panose="02070309020205020404" pitchFamily="49" charset="0"/>
                 <a:cs typeface="Courier New" panose="02070309020205020404" pitchFamily="49" charset="0"/>
               </a:rPr>
               <a:t>db</a:t>
             </a:r>
             <a:r>
-              <a:rPr lang="de-DE" dirty="0">
+              <a:rPr lang="de-DE" sz="1800" dirty="0">
                 <a:latin typeface="Courier New" panose="02070309020205020404" pitchFamily="49" charset="0"/>
                 <a:cs typeface="Courier New" panose="02070309020205020404" pitchFamily="49" charset="0"/>
               </a:rPr>
               <a:t> --</a:t>
             </a:r>
             <a:r>
-              <a:rPr lang="de-DE" dirty="0" err="1">
+              <a:rPr lang="de-DE" sz="1800" dirty="0" err="1">
                 <a:latin typeface="Courier New" panose="02070309020205020404" pitchFamily="49" charset="0"/>
                 <a:cs typeface="Courier New" panose="02070309020205020404" pitchFamily="49" charset="0"/>
               </a:rPr>
               <a:t>cpus</a:t>
             </a:r>
             <a:r>
-              <a:rPr lang="de-DE" dirty="0">
+              <a:rPr lang="de-DE" sz="1800" dirty="0">
                 <a:latin typeface="Courier New" panose="02070309020205020404" pitchFamily="49" charset="0"/>
                 <a:cs typeface="Courier New" panose="02070309020205020404" pitchFamily="49" charset="0"/>
               </a:rPr>
               <a:t> 2 --memory 2G --disk 20G </a:t>
             </a:r>
             <a:r>
-              <a:rPr lang="de-DE" dirty="0" err="1">
+              <a:rPr lang="de-DE" sz="1800" dirty="0" err="1">
                 <a:latin typeface="Courier New" panose="02070309020205020404" pitchFamily="49" charset="0"/>
                 <a:cs typeface="Courier New" panose="02070309020205020404" pitchFamily="49" charset="0"/>
               </a:rPr>
               <a:t>lts</a:t>
             </a:r>
-            <a:endParaRPr lang="de-DE" dirty="0">
+            <a:endParaRPr lang="de-DE" sz="1800" dirty="0">
               <a:latin typeface="Courier New" panose="02070309020205020404" pitchFamily="49" charset="0"/>
               <a:cs typeface="Courier New" panose="02070309020205020404" pitchFamily="49" charset="0"/>
             </a:endParaRPr>
@@ -4662,34 +4662,34 @@
               <a:buNone/>
             </a:pPr>
             <a:r>
-              <a:rPr lang="de-DE" sz="2400" dirty="0">
+              <a:rPr lang="de-DE" sz="2000" dirty="0">
                 <a:latin typeface="Courier New" panose="02070309020205020404" pitchFamily="49" charset="0"/>
                 <a:cs typeface="Courier New" panose="02070309020205020404" pitchFamily="49" charset="0"/>
               </a:rPr>
               <a:t>	multipass </a:t>
             </a:r>
             <a:r>
-              <a:rPr lang="de-DE" sz="2400" dirty="0" err="1">
+              <a:rPr lang="de-DE" sz="2000" dirty="0" err="1">
                 <a:latin typeface="Courier New" panose="02070309020205020404" pitchFamily="49" charset="0"/>
                 <a:cs typeface="Courier New" panose="02070309020205020404" pitchFamily="49" charset="0"/>
               </a:rPr>
               <a:t>shell</a:t>
             </a:r>
             <a:r>
-              <a:rPr lang="de-DE" sz="2400" dirty="0">
+              <a:rPr lang="de-DE" sz="2000" dirty="0">
                 <a:latin typeface="Courier New" panose="02070309020205020404" pitchFamily="49" charset="0"/>
                 <a:cs typeface="Courier New" panose="02070309020205020404" pitchFamily="49" charset="0"/>
               </a:rPr>
               <a:t> </a:t>
             </a:r>
             <a:r>
-              <a:rPr lang="de-DE" sz="2400" dirty="0" err="1">
+              <a:rPr lang="de-DE" sz="2000" dirty="0" err="1">
                 <a:latin typeface="Courier New" panose="02070309020205020404" pitchFamily="49" charset="0"/>
                 <a:cs typeface="Courier New" panose="02070309020205020404" pitchFamily="49" charset="0"/>
               </a:rPr>
               <a:t>master</a:t>
             </a:r>
-            <a:endParaRPr lang="de-DE" sz="2400" dirty="0">
+            <a:endParaRPr lang="de-DE" sz="2000" dirty="0">
               <a:latin typeface="Courier New" panose="02070309020205020404" pitchFamily="49" charset="0"/>
               <a:cs typeface="Courier New" panose="02070309020205020404" pitchFamily="49" charset="0"/>
             </a:endParaRPr>
@@ -4699,49 +4699,49 @@
               <a:buNone/>
             </a:pPr>
             <a:r>
-              <a:rPr lang="de-DE" sz="2400" dirty="0">
+              <a:rPr lang="de-DE" sz="2000" dirty="0">
                 <a:latin typeface="Courier New" panose="02070309020205020404" pitchFamily="49" charset="0"/>
                 <a:cs typeface="Courier New" panose="02070309020205020404" pitchFamily="49" charset="0"/>
               </a:rPr>
               <a:t>	</a:t>
             </a:r>
             <a:r>
-              <a:rPr lang="de-DE" sz="2400" dirty="0" err="1">
+              <a:rPr lang="de-DE" sz="2000" dirty="0" err="1">
                 <a:latin typeface="Courier New" panose="02070309020205020404" pitchFamily="49" charset="0"/>
                 <a:cs typeface="Courier New" panose="02070309020205020404" pitchFamily="49" charset="0"/>
               </a:rPr>
               <a:t>sudo</a:t>
             </a:r>
             <a:r>
-              <a:rPr lang="de-DE" sz="2400" dirty="0">
+              <a:rPr lang="de-DE" sz="2000" dirty="0">
                 <a:latin typeface="Courier New" panose="02070309020205020404" pitchFamily="49" charset="0"/>
                 <a:cs typeface="Courier New" panose="02070309020205020404" pitchFamily="49" charset="0"/>
               </a:rPr>
               <a:t> </a:t>
             </a:r>
             <a:r>
-              <a:rPr lang="de-DE" sz="2400" dirty="0" err="1">
+              <a:rPr lang="de-DE" sz="2000" dirty="0" err="1">
                 <a:latin typeface="Courier New" panose="02070309020205020404" pitchFamily="49" charset="0"/>
                 <a:cs typeface="Courier New" panose="02070309020205020404" pitchFamily="49" charset="0"/>
               </a:rPr>
               <a:t>snap</a:t>
             </a:r>
             <a:r>
-              <a:rPr lang="de-DE" sz="2400" dirty="0">
+              <a:rPr lang="de-DE" sz="2000" dirty="0">
                 <a:latin typeface="Courier New" panose="02070309020205020404" pitchFamily="49" charset="0"/>
                 <a:cs typeface="Courier New" panose="02070309020205020404" pitchFamily="49" charset="0"/>
               </a:rPr>
               <a:t> </a:t>
             </a:r>
             <a:r>
-              <a:rPr lang="de-DE" sz="2400" dirty="0" err="1">
+              <a:rPr lang="de-DE" sz="2000" dirty="0" err="1">
                 <a:latin typeface="Courier New" panose="02070309020205020404" pitchFamily="49" charset="0"/>
                 <a:cs typeface="Courier New" panose="02070309020205020404" pitchFamily="49" charset="0"/>
               </a:rPr>
               <a:t>install</a:t>
             </a:r>
             <a:r>
-              <a:rPr lang="de-DE" sz="2400" dirty="0">
+              <a:rPr lang="de-DE" sz="2000" dirty="0">
                 <a:latin typeface="Courier New" panose="02070309020205020404" pitchFamily="49" charset="0"/>
                 <a:cs typeface="Courier New" panose="02070309020205020404" pitchFamily="49" charset="0"/>
               </a:rPr>
@@ -4753,35 +4753,35 @@
               <a:buNone/>
             </a:pPr>
             <a:r>
-              <a:rPr lang="de-DE" sz="2400" dirty="0">
+              <a:rPr lang="de-DE" sz="2000" dirty="0">
                 <a:latin typeface="Courier New" panose="02070309020205020404" pitchFamily="49" charset="0"/>
                 <a:cs typeface="Courier New" panose="02070309020205020404" pitchFamily="49" charset="0"/>
               </a:rPr>
               <a:t>	</a:t>
             </a:r>
             <a:r>
-              <a:rPr lang="de-DE" sz="2400" dirty="0" err="1">
+              <a:rPr lang="de-DE" sz="2000" dirty="0" err="1">
                 <a:latin typeface="Courier New" panose="02070309020205020404" pitchFamily="49" charset="0"/>
                 <a:cs typeface="Courier New" panose="02070309020205020404" pitchFamily="49" charset="0"/>
               </a:rPr>
               <a:t>sudo</a:t>
             </a:r>
             <a:r>
-              <a:rPr lang="de-DE" sz="2400" dirty="0">
+              <a:rPr lang="de-DE" sz="2000" dirty="0">
                 <a:latin typeface="Courier New" panose="02070309020205020404" pitchFamily="49" charset="0"/>
                 <a:cs typeface="Courier New" panose="02070309020205020404" pitchFamily="49" charset="0"/>
               </a:rPr>
               <a:t> </a:t>
             </a:r>
             <a:r>
-              <a:rPr lang="de-DE" sz="2400" dirty="0" err="1">
+              <a:rPr lang="de-DE" sz="2000" dirty="0" err="1">
                 <a:latin typeface="Courier New" panose="02070309020205020404" pitchFamily="49" charset="0"/>
                 <a:cs typeface="Courier New" panose="02070309020205020404" pitchFamily="49" charset="0"/>
               </a:rPr>
               <a:t>usermod</a:t>
             </a:r>
             <a:r>
-              <a:rPr lang="de-DE" sz="2400" dirty="0">
+              <a:rPr lang="de-DE" sz="2000" dirty="0">
                 <a:latin typeface="Courier New" panose="02070309020205020404" pitchFamily="49" charset="0"/>
                 <a:cs typeface="Courier New" panose="02070309020205020404" pitchFamily="49" charset="0"/>
               </a:rPr>
@@ -4793,35 +4793,35 @@
               <a:buNone/>
             </a:pPr>
             <a:r>
-              <a:rPr lang="de-DE" sz="2400" dirty="0">
+              <a:rPr lang="de-DE" sz="2000" dirty="0">
                 <a:latin typeface="Courier New" panose="02070309020205020404" pitchFamily="49" charset="0"/>
                 <a:cs typeface="Courier New" panose="02070309020205020404" pitchFamily="49" charset="0"/>
               </a:rPr>
               <a:t>	</a:t>
             </a:r>
             <a:r>
-              <a:rPr lang="de-DE" sz="2400" dirty="0" err="1">
+              <a:rPr lang="de-DE" sz="2000" dirty="0" err="1">
                 <a:latin typeface="Courier New" panose="02070309020205020404" pitchFamily="49" charset="0"/>
                 <a:cs typeface="Courier New" panose="02070309020205020404" pitchFamily="49" charset="0"/>
               </a:rPr>
               <a:t>sudo</a:t>
             </a:r>
             <a:r>
-              <a:rPr lang="de-DE" sz="2400" dirty="0">
+              <a:rPr lang="de-DE" sz="2000" dirty="0">
                 <a:latin typeface="Courier New" panose="02070309020205020404" pitchFamily="49" charset="0"/>
                 <a:cs typeface="Courier New" panose="02070309020205020404" pitchFamily="49" charset="0"/>
               </a:rPr>
               <a:t> </a:t>
             </a:r>
             <a:r>
-              <a:rPr lang="de-DE" sz="2400" dirty="0" err="1">
+              <a:rPr lang="de-DE" sz="2000" dirty="0" err="1">
                 <a:latin typeface="Courier New" panose="02070309020205020404" pitchFamily="49" charset="0"/>
                 <a:cs typeface="Courier New" panose="02070309020205020404" pitchFamily="49" charset="0"/>
               </a:rPr>
               <a:t>apt-get</a:t>
             </a:r>
             <a:r>
-              <a:rPr lang="de-DE" sz="2400" dirty="0">
+              <a:rPr lang="de-DE" sz="2000" dirty="0">
                 <a:latin typeface="Courier New" panose="02070309020205020404" pitchFamily="49" charset="0"/>
                 <a:cs typeface="Courier New" panose="02070309020205020404" pitchFamily="49" charset="0"/>
               </a:rPr>
@@ -4833,60 +4833,60 @@
               <a:buNone/>
             </a:pPr>
             <a:r>
-              <a:rPr lang="de-DE" sz="2400" dirty="0"/>
+              <a:rPr lang="de-DE" sz="2000" dirty="0"/>
               <a:t>	</a:t>
             </a:r>
             <a:r>
-              <a:rPr lang="de-DE" sz="2400" dirty="0" err="1">
+              <a:rPr lang="de-DE" sz="2000" dirty="0" err="1">
                 <a:latin typeface="Courier New" panose="02070309020205020404" pitchFamily="49" charset="0"/>
                 <a:cs typeface="Courier New" panose="02070309020205020404" pitchFamily="49" charset="0"/>
               </a:rPr>
               <a:t>sudo</a:t>
             </a:r>
             <a:r>
-              <a:rPr lang="de-DE" sz="2400" dirty="0">
+              <a:rPr lang="de-DE" sz="2000" dirty="0">
                 <a:latin typeface="Courier New" panose="02070309020205020404" pitchFamily="49" charset="0"/>
                 <a:cs typeface="Courier New" panose="02070309020205020404" pitchFamily="49" charset="0"/>
               </a:rPr>
               <a:t> </a:t>
             </a:r>
             <a:r>
-              <a:rPr lang="de-DE" sz="2400" dirty="0" err="1">
+              <a:rPr lang="de-DE" sz="2000" dirty="0" err="1">
                 <a:latin typeface="Courier New" panose="02070309020205020404" pitchFamily="49" charset="0"/>
                 <a:cs typeface="Courier New" panose="02070309020205020404" pitchFamily="49" charset="0"/>
               </a:rPr>
               <a:t>apt</a:t>
             </a:r>
             <a:r>
-              <a:rPr lang="de-DE" sz="2400" dirty="0">
+              <a:rPr lang="de-DE" sz="2000" dirty="0">
                 <a:latin typeface="Courier New" panose="02070309020205020404" pitchFamily="49" charset="0"/>
                 <a:cs typeface="Courier New" panose="02070309020205020404" pitchFamily="49" charset="0"/>
               </a:rPr>
               <a:t> </a:t>
             </a:r>
             <a:r>
-              <a:rPr lang="de-DE" sz="2400" dirty="0" err="1">
+              <a:rPr lang="de-DE" sz="2000" dirty="0" err="1">
                 <a:latin typeface="Courier New" panose="02070309020205020404" pitchFamily="49" charset="0"/>
                 <a:cs typeface="Courier New" panose="02070309020205020404" pitchFamily="49" charset="0"/>
               </a:rPr>
               <a:t>install</a:t>
             </a:r>
             <a:r>
-              <a:rPr lang="de-DE" sz="2400" dirty="0">
+              <a:rPr lang="de-DE" sz="2000" dirty="0">
                 <a:latin typeface="Courier New" panose="02070309020205020404" pitchFamily="49" charset="0"/>
                 <a:cs typeface="Courier New" panose="02070309020205020404" pitchFamily="49" charset="0"/>
               </a:rPr>
               <a:t> </a:t>
             </a:r>
             <a:r>
-              <a:rPr lang="de-DE" sz="2400" dirty="0" err="1">
+              <a:rPr lang="de-DE" sz="2000" dirty="0" err="1">
                 <a:latin typeface="Courier New" panose="02070309020205020404" pitchFamily="49" charset="0"/>
                 <a:cs typeface="Courier New" panose="02070309020205020404" pitchFamily="49" charset="0"/>
               </a:rPr>
               <a:t>maven</a:t>
             </a:r>
             <a:r>
-              <a:rPr lang="de-DE" sz="2400" dirty="0">
+              <a:rPr lang="de-DE" sz="2000" dirty="0">
                 <a:latin typeface="Courier New" panose="02070309020205020404" pitchFamily="49" charset="0"/>
                 <a:cs typeface="Courier New" panose="02070309020205020404" pitchFamily="49" charset="0"/>
               </a:rPr>
@@ -4898,62 +4898,62 @@
               <a:buNone/>
             </a:pPr>
             <a:r>
-              <a:rPr lang="de-DE" sz="2400" dirty="0">
+              <a:rPr lang="de-DE" sz="2000" dirty="0">
                 <a:latin typeface="Courier New" panose="02070309020205020404" pitchFamily="49" charset="0"/>
                 <a:cs typeface="Courier New" panose="02070309020205020404" pitchFamily="49" charset="0"/>
               </a:rPr>
               <a:t>	</a:t>
             </a:r>
             <a:r>
-              <a:rPr lang="de-DE" sz="2400" dirty="0" err="1">
+              <a:rPr lang="de-DE" sz="2000" dirty="0" err="1">
                 <a:latin typeface="Courier New" panose="02070309020205020404" pitchFamily="49" charset="0"/>
                 <a:cs typeface="Courier New" panose="02070309020205020404" pitchFamily="49" charset="0"/>
               </a:rPr>
               <a:t>sudo</a:t>
             </a:r>
             <a:r>
-              <a:rPr lang="de-DE" sz="2400" dirty="0">
+              <a:rPr lang="de-DE" sz="2000" dirty="0">
                 <a:latin typeface="Courier New" panose="02070309020205020404" pitchFamily="49" charset="0"/>
                 <a:cs typeface="Courier New" panose="02070309020205020404" pitchFamily="49" charset="0"/>
               </a:rPr>
               <a:t> </a:t>
             </a:r>
             <a:r>
-              <a:rPr lang="de-DE" sz="2400" dirty="0" err="1">
+              <a:rPr lang="de-DE" sz="2000" dirty="0" err="1">
                 <a:latin typeface="Courier New" panose="02070309020205020404" pitchFamily="49" charset="0"/>
                 <a:cs typeface="Courier New" panose="02070309020205020404" pitchFamily="49" charset="0"/>
               </a:rPr>
               <a:t>snap</a:t>
             </a:r>
             <a:r>
-              <a:rPr lang="de-DE" sz="2400" dirty="0">
+              <a:rPr lang="de-DE" sz="2000" dirty="0">
                 <a:latin typeface="Courier New" panose="02070309020205020404" pitchFamily="49" charset="0"/>
                 <a:cs typeface="Courier New" panose="02070309020205020404" pitchFamily="49" charset="0"/>
               </a:rPr>
               <a:t> </a:t>
             </a:r>
             <a:r>
-              <a:rPr lang="de-DE" sz="2400" dirty="0" err="1">
+              <a:rPr lang="de-DE" sz="2000" dirty="0" err="1">
                 <a:latin typeface="Courier New" panose="02070309020205020404" pitchFamily="49" charset="0"/>
                 <a:cs typeface="Courier New" panose="02070309020205020404" pitchFamily="49" charset="0"/>
               </a:rPr>
               <a:t>install</a:t>
             </a:r>
             <a:r>
-              <a:rPr lang="de-DE" sz="2400" dirty="0">
+              <a:rPr lang="de-DE" sz="2000" dirty="0">
                 <a:latin typeface="Courier New" panose="02070309020205020404" pitchFamily="49" charset="0"/>
                 <a:cs typeface="Courier New" panose="02070309020205020404" pitchFamily="49" charset="0"/>
               </a:rPr>
               <a:t> </a:t>
             </a:r>
             <a:r>
-              <a:rPr lang="de-DE" sz="2400" dirty="0" err="1">
+              <a:rPr lang="de-DE" sz="2000" dirty="0" err="1">
                 <a:latin typeface="Courier New" panose="02070309020205020404" pitchFamily="49" charset="0"/>
                 <a:cs typeface="Courier New" panose="02070309020205020404" pitchFamily="49" charset="0"/>
               </a:rPr>
               <a:t>docker</a:t>
             </a:r>
-            <a:endParaRPr lang="de-DE" sz="2400" dirty="0">
+            <a:endParaRPr lang="de-DE" sz="2000" dirty="0">
               <a:latin typeface="Courier New" panose="02070309020205020404" pitchFamily="49" charset="0"/>
               <a:cs typeface="Courier New" panose="02070309020205020404" pitchFamily="49" charset="0"/>
             </a:endParaRPr>
@@ -4963,48 +4963,48 @@
               <a:buNone/>
             </a:pPr>
             <a:r>
-              <a:rPr lang="de-DE" sz="2400" dirty="0">
+              <a:rPr lang="de-DE" sz="2000" dirty="0">
                 <a:latin typeface="Courier New" panose="02070309020205020404" pitchFamily="49" charset="0"/>
                 <a:cs typeface="Courier New" panose="02070309020205020404" pitchFamily="49" charset="0"/>
               </a:rPr>
               <a:t>	</a:t>
             </a:r>
             <a:r>
-              <a:rPr lang="de-DE" sz="2400" dirty="0" err="1">
+              <a:rPr lang="de-DE" sz="2000" dirty="0" err="1">
                 <a:latin typeface="Courier New" panose="02070309020205020404" pitchFamily="49" charset="0"/>
                 <a:cs typeface="Courier New" panose="02070309020205020404" pitchFamily="49" charset="0"/>
               </a:rPr>
               <a:t>sudo</a:t>
             </a:r>
             <a:r>
-              <a:rPr lang="de-DE" sz="2400" dirty="0">
+              <a:rPr lang="de-DE" sz="2000" dirty="0">
                 <a:latin typeface="Courier New" panose="02070309020205020404" pitchFamily="49" charset="0"/>
                 <a:cs typeface="Courier New" panose="02070309020205020404" pitchFamily="49" charset="0"/>
               </a:rPr>
               <a:t> </a:t>
             </a:r>
             <a:r>
-              <a:rPr lang="de-DE" sz="2400" dirty="0" err="1">
+              <a:rPr lang="de-DE" sz="2000" dirty="0" err="1">
                 <a:latin typeface="Courier New" panose="02070309020205020404" pitchFamily="49" charset="0"/>
                 <a:cs typeface="Courier New" panose="02070309020205020404" pitchFamily="49" charset="0"/>
               </a:rPr>
               <a:t>addgroup</a:t>
             </a:r>
             <a:r>
-              <a:rPr lang="de-DE" sz="2400" dirty="0">
+              <a:rPr lang="de-DE" sz="2000" dirty="0">
                 <a:latin typeface="Courier New" panose="02070309020205020404" pitchFamily="49" charset="0"/>
                 <a:cs typeface="Courier New" panose="02070309020205020404" pitchFamily="49" charset="0"/>
               </a:rPr>
               <a:t> --system </a:t>
             </a:r>
             <a:r>
-              <a:rPr lang="de-DE" sz="2400" dirty="0" err="1">
+              <a:rPr lang="de-DE" sz="2000" dirty="0" err="1">
                 <a:latin typeface="Courier New" panose="02070309020205020404" pitchFamily="49" charset="0"/>
                 <a:cs typeface="Courier New" panose="02070309020205020404" pitchFamily="49" charset="0"/>
               </a:rPr>
               <a:t>docker</a:t>
             </a:r>
-            <a:endParaRPr lang="de-DE" sz="2400" dirty="0">
+            <a:endParaRPr lang="de-DE" sz="2000" dirty="0">
               <a:latin typeface="Courier New" panose="02070309020205020404" pitchFamily="49" charset="0"/>
               <a:cs typeface="Courier New" panose="02070309020205020404" pitchFamily="49" charset="0"/>
             </a:endParaRPr>
@@ -5014,48 +5014,48 @@
               <a:buNone/>
             </a:pPr>
             <a:r>
-              <a:rPr lang="de-DE" sz="2400" dirty="0">
+              <a:rPr lang="de-DE" sz="2000" dirty="0">
                 <a:latin typeface="Courier New" panose="02070309020205020404" pitchFamily="49" charset="0"/>
                 <a:cs typeface="Courier New" panose="02070309020205020404" pitchFamily="49" charset="0"/>
               </a:rPr>
               <a:t>	</a:t>
             </a:r>
             <a:r>
-              <a:rPr lang="de-DE" sz="2400" dirty="0" err="1">
+              <a:rPr lang="de-DE" sz="2000" dirty="0" err="1">
                 <a:latin typeface="Courier New" panose="02070309020205020404" pitchFamily="49" charset="0"/>
                 <a:cs typeface="Courier New" panose="02070309020205020404" pitchFamily="49" charset="0"/>
               </a:rPr>
               <a:t>sudo</a:t>
             </a:r>
             <a:r>
-              <a:rPr lang="de-DE" sz="2400" dirty="0">
+              <a:rPr lang="de-DE" sz="2000" dirty="0">
                 <a:latin typeface="Courier New" panose="02070309020205020404" pitchFamily="49" charset="0"/>
                 <a:cs typeface="Courier New" panose="02070309020205020404" pitchFamily="49" charset="0"/>
               </a:rPr>
               <a:t> </a:t>
             </a:r>
             <a:r>
-              <a:rPr lang="de-DE" sz="2400" dirty="0" err="1">
+              <a:rPr lang="de-DE" sz="2000" dirty="0" err="1">
                 <a:latin typeface="Courier New" panose="02070309020205020404" pitchFamily="49" charset="0"/>
                 <a:cs typeface="Courier New" panose="02070309020205020404" pitchFamily="49" charset="0"/>
               </a:rPr>
               <a:t>adduser</a:t>
             </a:r>
             <a:r>
-              <a:rPr lang="de-DE" sz="2400" dirty="0">
+              <a:rPr lang="de-DE" sz="2000" dirty="0">
                 <a:latin typeface="Courier New" panose="02070309020205020404" pitchFamily="49" charset="0"/>
                 <a:cs typeface="Courier New" panose="02070309020205020404" pitchFamily="49" charset="0"/>
               </a:rPr>
               <a:t> $USER </a:t>
             </a:r>
             <a:r>
-              <a:rPr lang="de-DE" sz="2400" dirty="0" err="1">
+              <a:rPr lang="de-DE" sz="2000" dirty="0" err="1">
                 <a:latin typeface="Courier New" panose="02070309020205020404" pitchFamily="49" charset="0"/>
                 <a:cs typeface="Courier New" panose="02070309020205020404" pitchFamily="49" charset="0"/>
               </a:rPr>
               <a:t>docker</a:t>
             </a:r>
-            <a:endParaRPr lang="de-DE" sz="2400" dirty="0">
+            <a:endParaRPr lang="de-DE" sz="2000" dirty="0">
               <a:latin typeface="Courier New" panose="02070309020205020404" pitchFamily="49" charset="0"/>
               <a:cs typeface="Courier New" panose="02070309020205020404" pitchFamily="49" charset="0"/>
             </a:endParaRPr>
@@ -5065,48 +5065,88 @@
               <a:buNone/>
             </a:pPr>
             <a:r>
-              <a:rPr lang="de-DE" sz="2400" dirty="0">
+              <a:rPr lang="de-DE" sz="2000" dirty="0">
                 <a:latin typeface="Courier New" panose="02070309020205020404" pitchFamily="49" charset="0"/>
                 <a:cs typeface="Courier New" panose="02070309020205020404" pitchFamily="49" charset="0"/>
               </a:rPr>
               <a:t>	</a:t>
             </a:r>
             <a:r>
-              <a:rPr lang="de-DE" sz="2400" dirty="0" err="1">
+              <a:rPr lang="de-DE" sz="2000" dirty="0" err="1">
                 <a:latin typeface="Courier New" panose="02070309020205020404" pitchFamily="49" charset="0"/>
                 <a:cs typeface="Courier New" panose="02070309020205020404" pitchFamily="49" charset="0"/>
               </a:rPr>
               <a:t>sudo</a:t>
             </a:r>
             <a:r>
-              <a:rPr lang="de-DE" sz="2400" dirty="0">
+              <a:rPr lang="de-DE" sz="2000" dirty="0">
                 <a:latin typeface="Courier New" panose="02070309020205020404" pitchFamily="49" charset="0"/>
                 <a:cs typeface="Courier New" panose="02070309020205020404" pitchFamily="49" charset="0"/>
               </a:rPr>
               <a:t> </a:t>
             </a:r>
             <a:r>
-              <a:rPr lang="de-DE" sz="2400" dirty="0" err="1">
+              <a:rPr lang="de-DE" sz="2000" dirty="0" err="1">
+                <a:latin typeface="Courier New" panose="02070309020205020404" pitchFamily="49" charset="0"/>
+                <a:cs typeface="Courier New" panose="02070309020205020404" pitchFamily="49" charset="0"/>
+              </a:rPr>
+              <a:t>docker</a:t>
+            </a:r>
+            <a:r>
+              <a:rPr lang="de-DE" sz="2000" dirty="0">
+                <a:latin typeface="Courier New" panose="02070309020205020404" pitchFamily="49" charset="0"/>
+                <a:cs typeface="Courier New" panose="02070309020205020404" pitchFamily="49" charset="0"/>
+              </a:rPr>
+              <a:t> pull openjdk:17-slim-bullseye</a:t>
+            </a:r>
+          </a:p>
+          <a:p>
+            <a:pPr marL="0" indent="0">
+              <a:buNone/>
+            </a:pPr>
+            <a:r>
+              <a:rPr lang="de-DE" sz="2000" dirty="0">
+                <a:latin typeface="Courier New" panose="02070309020205020404" pitchFamily="49" charset="0"/>
+                <a:cs typeface="Courier New" panose="02070309020205020404" pitchFamily="49" charset="0"/>
+              </a:rPr>
+              <a:t>	</a:t>
+            </a:r>
+            <a:r>
+              <a:rPr lang="de-DE" sz="2000" dirty="0" err="1">
+                <a:latin typeface="Courier New" panose="02070309020205020404" pitchFamily="49" charset="0"/>
+                <a:cs typeface="Courier New" panose="02070309020205020404" pitchFamily="49" charset="0"/>
+              </a:rPr>
+              <a:t>sudo</a:t>
+            </a:r>
+            <a:r>
+              <a:rPr lang="de-DE" sz="2000" dirty="0">
+                <a:latin typeface="Courier New" panose="02070309020205020404" pitchFamily="49" charset="0"/>
+                <a:cs typeface="Courier New" panose="02070309020205020404" pitchFamily="49" charset="0"/>
+              </a:rPr>
+              <a:t> </a:t>
+            </a:r>
+            <a:r>
+              <a:rPr lang="de-DE" sz="2000" dirty="0" err="1">
                 <a:latin typeface="Courier New" panose="02070309020205020404" pitchFamily="49" charset="0"/>
                 <a:cs typeface="Courier New" panose="02070309020205020404" pitchFamily="49" charset="0"/>
               </a:rPr>
               <a:t>shutdown</a:t>
             </a:r>
             <a:r>
-              <a:rPr lang="de-DE" sz="2400" dirty="0">
+              <a:rPr lang="de-DE" sz="2000" dirty="0">
                 <a:latin typeface="Courier New" panose="02070309020205020404" pitchFamily="49" charset="0"/>
                 <a:cs typeface="Courier New" panose="02070309020205020404" pitchFamily="49" charset="0"/>
               </a:rPr>
               <a:t> -h </a:t>
             </a:r>
             <a:r>
-              <a:rPr lang="de-DE" sz="2400" dirty="0" err="1">
+              <a:rPr lang="de-DE" sz="2000" dirty="0" err="1">
                 <a:latin typeface="Courier New" panose="02070309020205020404" pitchFamily="49" charset="0"/>
                 <a:cs typeface="Courier New" panose="02070309020205020404" pitchFamily="49" charset="0"/>
               </a:rPr>
               <a:t>now</a:t>
             </a:r>
-            <a:endParaRPr lang="de-DE" sz="2400" dirty="0">
+            <a:endParaRPr lang="de-DE" sz="2000" dirty="0">
               <a:latin typeface="Courier New" panose="02070309020205020404" pitchFamily="49" charset="0"/>
               <a:cs typeface="Courier New" panose="02070309020205020404" pitchFamily="49" charset="0"/>
             </a:endParaRPr>
@@ -5219,25 +5259,25 @@
               <a:buNone/>
             </a:pPr>
             <a:r>
-              <a:rPr lang="de-DE" dirty="0"/>
+              <a:rPr lang="de-DE" sz="2000" dirty="0"/>
               <a:t>	</a:t>
             </a:r>
             <a:r>
-              <a:rPr lang="de-DE" sz="2400" dirty="0">
+              <a:rPr lang="de-DE" sz="2000" dirty="0">
                 <a:latin typeface="Courier New" panose="02070309020205020404" pitchFamily="49" charset="0"/>
                 <a:cs typeface="Courier New" panose="02070309020205020404" pitchFamily="49" charset="0"/>
               </a:rPr>
               <a:t>multipass </a:t>
             </a:r>
             <a:r>
-              <a:rPr lang="de-DE" sz="2400" dirty="0" err="1">
+              <a:rPr lang="de-DE" sz="2000" dirty="0" err="1">
                 <a:latin typeface="Courier New" panose="02070309020205020404" pitchFamily="49" charset="0"/>
                 <a:cs typeface="Courier New" panose="02070309020205020404" pitchFamily="49" charset="0"/>
               </a:rPr>
               <a:t>shell</a:t>
             </a:r>
             <a:r>
-              <a:rPr lang="de-DE" sz="2400" dirty="0">
+              <a:rPr lang="de-DE" sz="2000" dirty="0">
                 <a:latin typeface="Courier New" panose="02070309020205020404" pitchFamily="49" charset="0"/>
                 <a:cs typeface="Courier New" panose="02070309020205020404" pitchFamily="49" charset="0"/>
               </a:rPr>
@@ -5249,49 +5289,49 @@
               <a:buNone/>
             </a:pPr>
             <a:r>
-              <a:rPr lang="de-DE" sz="2400" dirty="0">
+              <a:rPr lang="de-DE" sz="2000" dirty="0">
                 <a:latin typeface="Courier New" panose="02070309020205020404" pitchFamily="49" charset="0"/>
                 <a:cs typeface="Courier New" panose="02070309020205020404" pitchFamily="49" charset="0"/>
               </a:rPr>
               <a:t>	</a:t>
             </a:r>
             <a:r>
-              <a:rPr lang="de-DE" sz="2400" dirty="0" err="1">
+              <a:rPr lang="de-DE" sz="2000" dirty="0" err="1">
                 <a:latin typeface="Courier New" panose="02070309020205020404" pitchFamily="49" charset="0"/>
                 <a:cs typeface="Courier New" panose="02070309020205020404" pitchFamily="49" charset="0"/>
               </a:rPr>
               <a:t>sudo</a:t>
             </a:r>
             <a:r>
-              <a:rPr lang="de-DE" sz="2400" dirty="0">
+              <a:rPr lang="de-DE" sz="2000" dirty="0">
                 <a:latin typeface="Courier New" panose="02070309020205020404" pitchFamily="49" charset="0"/>
                 <a:cs typeface="Courier New" panose="02070309020205020404" pitchFamily="49" charset="0"/>
               </a:rPr>
               <a:t> </a:t>
             </a:r>
             <a:r>
-              <a:rPr lang="de-DE" sz="2400" dirty="0" err="1">
+              <a:rPr lang="de-DE" sz="2000" dirty="0" err="1">
                 <a:latin typeface="Courier New" panose="02070309020205020404" pitchFamily="49" charset="0"/>
                 <a:cs typeface="Courier New" panose="02070309020205020404" pitchFamily="49" charset="0"/>
               </a:rPr>
               <a:t>snap</a:t>
             </a:r>
             <a:r>
-              <a:rPr lang="de-DE" sz="2400" dirty="0">
+              <a:rPr lang="de-DE" sz="2000" dirty="0">
                 <a:latin typeface="Courier New" panose="02070309020205020404" pitchFamily="49" charset="0"/>
                 <a:cs typeface="Courier New" panose="02070309020205020404" pitchFamily="49" charset="0"/>
               </a:rPr>
               <a:t> </a:t>
             </a:r>
             <a:r>
-              <a:rPr lang="de-DE" sz="2400" dirty="0" err="1">
+              <a:rPr lang="de-DE" sz="2000" dirty="0" err="1">
                 <a:latin typeface="Courier New" panose="02070309020205020404" pitchFamily="49" charset="0"/>
                 <a:cs typeface="Courier New" panose="02070309020205020404" pitchFamily="49" charset="0"/>
               </a:rPr>
               <a:t>install</a:t>
             </a:r>
             <a:r>
-              <a:rPr lang="de-DE" sz="2400" dirty="0">
+              <a:rPr lang="de-DE" sz="2000" dirty="0">
                 <a:latin typeface="Courier New" panose="02070309020205020404" pitchFamily="49" charset="0"/>
                 <a:cs typeface="Courier New" panose="02070309020205020404" pitchFamily="49" charset="0"/>
               </a:rPr>
@@ -5303,35 +5343,35 @@
               <a:buNone/>
             </a:pPr>
             <a:r>
-              <a:rPr lang="de-DE" sz="2400" dirty="0">
+              <a:rPr lang="de-DE" sz="2000" dirty="0">
                 <a:latin typeface="Courier New" panose="02070309020205020404" pitchFamily="49" charset="0"/>
                 <a:cs typeface="Courier New" panose="02070309020205020404" pitchFamily="49" charset="0"/>
               </a:rPr>
               <a:t>	</a:t>
             </a:r>
             <a:r>
-              <a:rPr lang="de-DE" sz="2400" dirty="0" err="1">
+              <a:rPr lang="de-DE" sz="2000" dirty="0" err="1">
                 <a:latin typeface="Courier New" panose="02070309020205020404" pitchFamily="49" charset="0"/>
                 <a:cs typeface="Courier New" panose="02070309020205020404" pitchFamily="49" charset="0"/>
               </a:rPr>
               <a:t>sudo</a:t>
             </a:r>
             <a:r>
-              <a:rPr lang="de-DE" sz="2400" dirty="0">
+              <a:rPr lang="de-DE" sz="2000" dirty="0">
                 <a:latin typeface="Courier New" panose="02070309020205020404" pitchFamily="49" charset="0"/>
                 <a:cs typeface="Courier New" panose="02070309020205020404" pitchFamily="49" charset="0"/>
               </a:rPr>
               <a:t> </a:t>
             </a:r>
             <a:r>
-              <a:rPr lang="de-DE" sz="2400" dirty="0" err="1">
+              <a:rPr lang="de-DE" sz="2000" dirty="0" err="1">
                 <a:latin typeface="Courier New" panose="02070309020205020404" pitchFamily="49" charset="0"/>
                 <a:cs typeface="Courier New" panose="02070309020205020404" pitchFamily="49" charset="0"/>
               </a:rPr>
               <a:t>usermod</a:t>
             </a:r>
             <a:r>
-              <a:rPr lang="de-DE" sz="2400" dirty="0">
+              <a:rPr lang="de-DE" sz="2000" dirty="0">
                 <a:latin typeface="Courier New" panose="02070309020205020404" pitchFamily="49" charset="0"/>
                 <a:cs typeface="Courier New" panose="02070309020205020404" pitchFamily="49" charset="0"/>
               </a:rPr>
@@ -5343,48 +5383,48 @@
               <a:buNone/>
             </a:pPr>
             <a:r>
-              <a:rPr lang="de-DE" sz="2400" dirty="0">
+              <a:rPr lang="de-DE" sz="2000" dirty="0">
                 <a:latin typeface="Courier New" panose="02070309020205020404" pitchFamily="49" charset="0"/>
                 <a:cs typeface="Courier New" panose="02070309020205020404" pitchFamily="49" charset="0"/>
               </a:rPr>
               <a:t>	</a:t>
             </a:r>
             <a:r>
-              <a:rPr lang="de-DE" sz="2400" dirty="0" err="1">
+              <a:rPr lang="de-DE" sz="2000" dirty="0" err="1">
                 <a:latin typeface="Courier New" panose="02070309020205020404" pitchFamily="49" charset="0"/>
                 <a:cs typeface="Courier New" panose="02070309020205020404" pitchFamily="49" charset="0"/>
               </a:rPr>
               <a:t>sudo</a:t>
             </a:r>
             <a:r>
-              <a:rPr lang="de-DE" sz="2400" dirty="0">
+              <a:rPr lang="de-DE" sz="2000" dirty="0">
                 <a:latin typeface="Courier New" panose="02070309020205020404" pitchFamily="49" charset="0"/>
                 <a:cs typeface="Courier New" panose="02070309020205020404" pitchFamily="49" charset="0"/>
               </a:rPr>
               <a:t> </a:t>
             </a:r>
             <a:r>
-              <a:rPr lang="de-DE" sz="2400" dirty="0" err="1">
+              <a:rPr lang="de-DE" sz="2000" dirty="0" err="1">
                 <a:latin typeface="Courier New" panose="02070309020205020404" pitchFamily="49" charset="0"/>
                 <a:cs typeface="Courier New" panose="02070309020205020404" pitchFamily="49" charset="0"/>
               </a:rPr>
               <a:t>shutdown</a:t>
             </a:r>
             <a:r>
-              <a:rPr lang="de-DE" sz="2400" dirty="0">
+              <a:rPr lang="de-DE" sz="2000" dirty="0">
                 <a:latin typeface="Courier New" panose="02070309020205020404" pitchFamily="49" charset="0"/>
                 <a:cs typeface="Courier New" panose="02070309020205020404" pitchFamily="49" charset="0"/>
               </a:rPr>
               <a:t> -h </a:t>
             </a:r>
             <a:r>
-              <a:rPr lang="de-DE" sz="2400" dirty="0" err="1">
+              <a:rPr lang="de-DE" sz="2000" dirty="0" err="1">
                 <a:latin typeface="Courier New" panose="02070309020205020404" pitchFamily="49" charset="0"/>
                 <a:cs typeface="Courier New" panose="02070309020205020404" pitchFamily="49" charset="0"/>
               </a:rPr>
               <a:t>now</a:t>
             </a:r>
-            <a:endParaRPr lang="de-DE" sz="2400" dirty="0">
+            <a:endParaRPr lang="de-DE" sz="2000" dirty="0">
               <a:latin typeface="Courier New" panose="02070309020205020404" pitchFamily="49" charset="0"/>
               <a:cs typeface="Courier New" panose="02070309020205020404" pitchFamily="49" charset="0"/>
             </a:endParaRPr>
@@ -5497,25 +5537,25 @@
               <a:buNone/>
             </a:pPr>
             <a:r>
-              <a:rPr lang="de-DE" dirty="0"/>
+              <a:rPr lang="de-DE" sz="2000" dirty="0"/>
               <a:t>	</a:t>
             </a:r>
             <a:r>
-              <a:rPr lang="de-DE" sz="2400" dirty="0">
+              <a:rPr lang="de-DE" sz="2000" dirty="0">
                 <a:latin typeface="Courier New" panose="02070309020205020404" pitchFamily="49" charset="0"/>
                 <a:cs typeface="Courier New" panose="02070309020205020404" pitchFamily="49" charset="0"/>
               </a:rPr>
               <a:t>multipass </a:t>
             </a:r>
             <a:r>
-              <a:rPr lang="de-DE" sz="2400" dirty="0" err="1">
+              <a:rPr lang="de-DE" sz="2000" dirty="0" err="1">
                 <a:latin typeface="Courier New" panose="02070309020205020404" pitchFamily="49" charset="0"/>
                 <a:cs typeface="Courier New" panose="02070309020205020404" pitchFamily="49" charset="0"/>
               </a:rPr>
               <a:t>shell</a:t>
             </a:r>
             <a:r>
-              <a:rPr lang="de-DE" sz="2400" dirty="0">
+              <a:rPr lang="de-DE" sz="2000" dirty="0">
                 <a:latin typeface="Courier New" panose="02070309020205020404" pitchFamily="49" charset="0"/>
                 <a:cs typeface="Courier New" panose="02070309020205020404" pitchFamily="49" charset="0"/>
               </a:rPr>
@@ -5527,49 +5567,49 @@
               <a:buNone/>
             </a:pPr>
             <a:r>
-              <a:rPr lang="de-DE" sz="2400" dirty="0">
+              <a:rPr lang="de-DE" sz="2000" dirty="0">
                 <a:latin typeface="Courier New" panose="02070309020205020404" pitchFamily="49" charset="0"/>
                 <a:cs typeface="Courier New" panose="02070309020205020404" pitchFamily="49" charset="0"/>
               </a:rPr>
               <a:t>	</a:t>
             </a:r>
             <a:r>
-              <a:rPr lang="de-DE" sz="2400" dirty="0" err="1">
+              <a:rPr lang="de-DE" sz="2000" dirty="0" err="1">
                 <a:latin typeface="Courier New" panose="02070309020205020404" pitchFamily="49" charset="0"/>
                 <a:cs typeface="Courier New" panose="02070309020205020404" pitchFamily="49" charset="0"/>
               </a:rPr>
               <a:t>sudo</a:t>
             </a:r>
             <a:r>
-              <a:rPr lang="de-DE" sz="2400" dirty="0">
+              <a:rPr lang="de-DE" sz="2000" dirty="0">
                 <a:latin typeface="Courier New" panose="02070309020205020404" pitchFamily="49" charset="0"/>
                 <a:cs typeface="Courier New" panose="02070309020205020404" pitchFamily="49" charset="0"/>
               </a:rPr>
               <a:t> </a:t>
             </a:r>
             <a:r>
-              <a:rPr lang="de-DE" sz="2400" dirty="0" err="1">
+              <a:rPr lang="de-DE" sz="2000" dirty="0" err="1">
                 <a:latin typeface="Courier New" panose="02070309020205020404" pitchFamily="49" charset="0"/>
                 <a:cs typeface="Courier New" panose="02070309020205020404" pitchFamily="49" charset="0"/>
               </a:rPr>
               <a:t>snap</a:t>
             </a:r>
             <a:r>
-              <a:rPr lang="de-DE" sz="2400" dirty="0">
+              <a:rPr lang="de-DE" sz="2000" dirty="0">
                 <a:latin typeface="Courier New" panose="02070309020205020404" pitchFamily="49" charset="0"/>
                 <a:cs typeface="Courier New" panose="02070309020205020404" pitchFamily="49" charset="0"/>
               </a:rPr>
               <a:t> </a:t>
             </a:r>
             <a:r>
-              <a:rPr lang="de-DE" sz="2400" dirty="0" err="1">
+              <a:rPr lang="de-DE" sz="2000" dirty="0" err="1">
                 <a:latin typeface="Courier New" panose="02070309020205020404" pitchFamily="49" charset="0"/>
                 <a:cs typeface="Courier New" panose="02070309020205020404" pitchFamily="49" charset="0"/>
               </a:rPr>
               <a:t>install</a:t>
             </a:r>
             <a:r>
-              <a:rPr lang="de-DE" sz="2400" dirty="0">
+              <a:rPr lang="de-DE" sz="2000" dirty="0">
                 <a:latin typeface="Courier New" panose="02070309020205020404" pitchFamily="49" charset="0"/>
                 <a:cs typeface="Courier New" panose="02070309020205020404" pitchFamily="49" charset="0"/>
               </a:rPr>
@@ -5581,35 +5621,35 @@
               <a:buNone/>
             </a:pPr>
             <a:r>
-              <a:rPr lang="de-DE" sz="2400" dirty="0">
+              <a:rPr lang="de-DE" sz="2000" dirty="0">
                 <a:latin typeface="Courier New" panose="02070309020205020404" pitchFamily="49" charset="0"/>
                 <a:cs typeface="Courier New" panose="02070309020205020404" pitchFamily="49" charset="0"/>
               </a:rPr>
               <a:t>	</a:t>
             </a:r>
             <a:r>
-              <a:rPr lang="de-DE" sz="2400" dirty="0" err="1">
+              <a:rPr lang="de-DE" sz="2000" dirty="0" err="1">
                 <a:latin typeface="Courier New" panose="02070309020205020404" pitchFamily="49" charset="0"/>
                 <a:cs typeface="Courier New" panose="02070309020205020404" pitchFamily="49" charset="0"/>
               </a:rPr>
               <a:t>sudo</a:t>
             </a:r>
             <a:r>
-              <a:rPr lang="de-DE" sz="2400" dirty="0">
+              <a:rPr lang="de-DE" sz="2000" dirty="0">
                 <a:latin typeface="Courier New" panose="02070309020205020404" pitchFamily="49" charset="0"/>
                 <a:cs typeface="Courier New" panose="02070309020205020404" pitchFamily="49" charset="0"/>
               </a:rPr>
               <a:t> </a:t>
             </a:r>
             <a:r>
-              <a:rPr lang="de-DE" sz="2400" dirty="0" err="1">
+              <a:rPr lang="de-DE" sz="2000" dirty="0" err="1">
                 <a:latin typeface="Courier New" panose="02070309020205020404" pitchFamily="49" charset="0"/>
                 <a:cs typeface="Courier New" panose="02070309020205020404" pitchFamily="49" charset="0"/>
               </a:rPr>
               <a:t>usermod</a:t>
             </a:r>
             <a:r>
-              <a:rPr lang="de-DE" sz="2400" dirty="0">
+              <a:rPr lang="de-DE" sz="2000" dirty="0">
                 <a:latin typeface="Courier New" panose="02070309020205020404" pitchFamily="49" charset="0"/>
                 <a:cs typeface="Courier New" panose="02070309020205020404" pitchFamily="49" charset="0"/>
               </a:rPr>
@@ -5621,48 +5661,48 @@
               <a:buNone/>
             </a:pPr>
             <a:r>
-              <a:rPr lang="de-DE" sz="2400" dirty="0">
+              <a:rPr lang="de-DE" sz="2000" dirty="0">
                 <a:latin typeface="Courier New" panose="02070309020205020404" pitchFamily="49" charset="0"/>
                 <a:cs typeface="Courier New" panose="02070309020205020404" pitchFamily="49" charset="0"/>
               </a:rPr>
               <a:t>	</a:t>
             </a:r>
             <a:r>
-              <a:rPr lang="de-DE" sz="2400" dirty="0" err="1">
+              <a:rPr lang="de-DE" sz="2000" dirty="0" err="1">
                 <a:latin typeface="Courier New" panose="02070309020205020404" pitchFamily="49" charset="0"/>
                 <a:cs typeface="Courier New" panose="02070309020205020404" pitchFamily="49" charset="0"/>
               </a:rPr>
               <a:t>sudo</a:t>
             </a:r>
             <a:r>
-              <a:rPr lang="de-DE" sz="2400" dirty="0">
+              <a:rPr lang="de-DE" sz="2000" dirty="0">
                 <a:latin typeface="Courier New" panose="02070309020205020404" pitchFamily="49" charset="0"/>
                 <a:cs typeface="Courier New" panose="02070309020205020404" pitchFamily="49" charset="0"/>
               </a:rPr>
               <a:t> </a:t>
             </a:r>
             <a:r>
-              <a:rPr lang="de-DE" sz="2400" dirty="0" err="1">
+              <a:rPr lang="de-DE" sz="2000" dirty="0" err="1">
                 <a:latin typeface="Courier New" panose="02070309020205020404" pitchFamily="49" charset="0"/>
                 <a:cs typeface="Courier New" panose="02070309020205020404" pitchFamily="49" charset="0"/>
               </a:rPr>
               <a:t>shutdown</a:t>
             </a:r>
             <a:r>
-              <a:rPr lang="de-DE" sz="2400" dirty="0">
+              <a:rPr lang="de-DE" sz="2000" dirty="0">
                 <a:latin typeface="Courier New" panose="02070309020205020404" pitchFamily="49" charset="0"/>
                 <a:cs typeface="Courier New" panose="02070309020205020404" pitchFamily="49" charset="0"/>
               </a:rPr>
               <a:t> -h </a:t>
             </a:r>
             <a:r>
-              <a:rPr lang="de-DE" sz="2400" dirty="0" err="1">
+              <a:rPr lang="de-DE" sz="2000" dirty="0" err="1">
                 <a:latin typeface="Courier New" panose="02070309020205020404" pitchFamily="49" charset="0"/>
                 <a:cs typeface="Courier New" panose="02070309020205020404" pitchFamily="49" charset="0"/>
               </a:rPr>
               <a:t>now</a:t>
             </a:r>
-            <a:endParaRPr lang="de-DE" sz="2400" dirty="0">
+            <a:endParaRPr lang="de-DE" sz="2000" dirty="0">
               <a:latin typeface="Courier New" panose="02070309020205020404" pitchFamily="49" charset="0"/>
               <a:cs typeface="Courier New" panose="02070309020205020404" pitchFamily="49" charset="0"/>
             </a:endParaRPr>
@@ -5743,7 +5783,12 @@
             <p:ph idx="1"/>
           </p:nvPr>
         </p:nvSpPr>
-        <p:spPr/>
+        <p:spPr>
+          <a:xfrm>
+            <a:off x="838200" y="1814195"/>
+            <a:ext cx="10515600" cy="4351338"/>
+          </a:xfrm>
+        </p:spPr>
         <p:txBody>
           <a:bodyPr>
             <a:normAutofit/>
@@ -5771,34 +5816,34 @@
               <a:buNone/>
             </a:pPr>
             <a:r>
-              <a:rPr lang="de-DE" sz="2400" dirty="0">
+              <a:rPr lang="de-DE" sz="2000" dirty="0">
                 <a:latin typeface="Courier New" panose="02070309020205020404" pitchFamily="49" charset="0"/>
                 <a:cs typeface="Courier New" panose="02070309020205020404" pitchFamily="49" charset="0"/>
               </a:rPr>
               <a:t>	multipass </a:t>
             </a:r>
             <a:r>
-              <a:rPr lang="de-DE" sz="2400" dirty="0" err="1">
+              <a:rPr lang="de-DE" sz="2000" dirty="0" err="1">
                 <a:latin typeface="Courier New" panose="02070309020205020404" pitchFamily="49" charset="0"/>
                 <a:cs typeface="Courier New" panose="02070309020205020404" pitchFamily="49" charset="0"/>
               </a:rPr>
               <a:t>shell</a:t>
             </a:r>
             <a:r>
-              <a:rPr lang="de-DE" sz="2400" dirty="0">
+              <a:rPr lang="de-DE" sz="2000" dirty="0">
                 <a:latin typeface="Courier New" panose="02070309020205020404" pitchFamily="49" charset="0"/>
                 <a:cs typeface="Courier New" panose="02070309020205020404" pitchFamily="49" charset="0"/>
               </a:rPr>
               <a:t> </a:t>
             </a:r>
             <a:r>
-              <a:rPr lang="de-DE" sz="2400" dirty="0" err="1">
+              <a:rPr lang="de-DE" sz="2000" dirty="0" err="1">
                 <a:latin typeface="Courier New" panose="02070309020205020404" pitchFamily="49" charset="0"/>
                 <a:cs typeface="Courier New" panose="02070309020205020404" pitchFamily="49" charset="0"/>
               </a:rPr>
               <a:t>master</a:t>
             </a:r>
-            <a:endParaRPr lang="de-DE" sz="2400" dirty="0">
+            <a:endParaRPr lang="de-DE" sz="2000" dirty="0">
               <a:latin typeface="Courier New" panose="02070309020205020404" pitchFamily="49" charset="0"/>
               <a:cs typeface="Courier New" panose="02070309020205020404" pitchFamily="49" charset="0"/>
             </a:endParaRPr>
@@ -5808,62 +5853,62 @@
               <a:buNone/>
             </a:pPr>
             <a:r>
-              <a:rPr lang="de-DE" sz="2400" dirty="0">
+              <a:rPr lang="de-DE" sz="2000" dirty="0">
                 <a:latin typeface="Courier New" panose="02070309020205020404" pitchFamily="49" charset="0"/>
                 <a:cs typeface="Courier New" panose="02070309020205020404" pitchFamily="49" charset="0"/>
               </a:rPr>
               <a:t>	</a:t>
             </a:r>
             <a:r>
-              <a:rPr lang="de-DE" sz="2400" dirty="0" err="1">
+              <a:rPr lang="de-DE" sz="2000" dirty="0" err="1">
                 <a:latin typeface="Courier New" panose="02070309020205020404" pitchFamily="49" charset="0"/>
                 <a:cs typeface="Courier New" panose="02070309020205020404" pitchFamily="49" charset="0"/>
               </a:rPr>
               <a:t>sudo</a:t>
             </a:r>
             <a:r>
-              <a:rPr lang="de-DE" sz="2400" dirty="0">
+              <a:rPr lang="de-DE" sz="2000" dirty="0">
                 <a:latin typeface="Courier New" panose="02070309020205020404" pitchFamily="49" charset="0"/>
                 <a:cs typeface="Courier New" panose="02070309020205020404" pitchFamily="49" charset="0"/>
               </a:rPr>
               <a:t> </a:t>
             </a:r>
             <a:r>
-              <a:rPr lang="de-DE" sz="2400" dirty="0" err="1">
+              <a:rPr lang="de-DE" sz="2000" dirty="0" err="1">
                 <a:latin typeface="Courier New" panose="02070309020205020404" pitchFamily="49" charset="0"/>
                 <a:cs typeface="Courier New" panose="02070309020205020404" pitchFamily="49" charset="0"/>
               </a:rPr>
               <a:t>snap</a:t>
             </a:r>
             <a:r>
-              <a:rPr lang="de-DE" sz="2400" dirty="0">
+              <a:rPr lang="de-DE" sz="2000" dirty="0">
                 <a:latin typeface="Courier New" panose="02070309020205020404" pitchFamily="49" charset="0"/>
                 <a:cs typeface="Courier New" panose="02070309020205020404" pitchFamily="49" charset="0"/>
               </a:rPr>
               <a:t> </a:t>
             </a:r>
             <a:r>
-              <a:rPr lang="de-DE" sz="2400" dirty="0" err="1">
+              <a:rPr lang="de-DE" sz="2000" dirty="0" err="1">
                 <a:latin typeface="Courier New" panose="02070309020205020404" pitchFamily="49" charset="0"/>
                 <a:cs typeface="Courier New" panose="02070309020205020404" pitchFamily="49" charset="0"/>
               </a:rPr>
               <a:t>install</a:t>
             </a:r>
             <a:r>
-              <a:rPr lang="de-DE" sz="2400" dirty="0">
+              <a:rPr lang="de-DE" sz="2000" dirty="0">
                 <a:latin typeface="Courier New" panose="02070309020205020404" pitchFamily="49" charset="0"/>
                 <a:cs typeface="Courier New" panose="02070309020205020404" pitchFamily="49" charset="0"/>
               </a:rPr>
               <a:t> </a:t>
             </a:r>
             <a:r>
-              <a:rPr lang="de-DE" sz="2400" dirty="0" err="1">
+              <a:rPr lang="de-DE" sz="2000" dirty="0" err="1">
                 <a:latin typeface="Courier New" panose="02070309020205020404" pitchFamily="49" charset="0"/>
                 <a:cs typeface="Courier New" panose="02070309020205020404" pitchFamily="49" charset="0"/>
               </a:rPr>
               <a:t>docker</a:t>
             </a:r>
-            <a:endParaRPr lang="de-DE" sz="2400" dirty="0">
+            <a:endParaRPr lang="de-DE" sz="2000" dirty="0">
               <a:latin typeface="Courier New" panose="02070309020205020404" pitchFamily="49" charset="0"/>
               <a:cs typeface="Courier New" panose="02070309020205020404" pitchFamily="49" charset="0"/>
             </a:endParaRPr>
@@ -5873,48 +5918,48 @@
               <a:buNone/>
             </a:pPr>
             <a:r>
-              <a:rPr lang="de-DE" sz="2400" dirty="0">
+              <a:rPr lang="de-DE" sz="2000" dirty="0">
                 <a:latin typeface="Courier New" panose="02070309020205020404" pitchFamily="49" charset="0"/>
                 <a:cs typeface="Courier New" panose="02070309020205020404" pitchFamily="49" charset="0"/>
               </a:rPr>
               <a:t>	</a:t>
             </a:r>
             <a:r>
-              <a:rPr lang="de-DE" sz="2400" dirty="0" err="1">
+              <a:rPr lang="de-DE" sz="2000" dirty="0" err="1">
                 <a:latin typeface="Courier New" panose="02070309020205020404" pitchFamily="49" charset="0"/>
                 <a:cs typeface="Courier New" panose="02070309020205020404" pitchFamily="49" charset="0"/>
               </a:rPr>
               <a:t>sudo</a:t>
             </a:r>
             <a:r>
-              <a:rPr lang="de-DE" sz="2400" dirty="0">
+              <a:rPr lang="de-DE" sz="2000" dirty="0">
                 <a:latin typeface="Courier New" panose="02070309020205020404" pitchFamily="49" charset="0"/>
                 <a:cs typeface="Courier New" panose="02070309020205020404" pitchFamily="49" charset="0"/>
               </a:rPr>
               <a:t> </a:t>
             </a:r>
             <a:r>
-              <a:rPr lang="de-DE" sz="2400" dirty="0" err="1">
+              <a:rPr lang="de-DE" sz="2000" dirty="0" err="1">
                 <a:latin typeface="Courier New" panose="02070309020205020404" pitchFamily="49" charset="0"/>
                 <a:cs typeface="Courier New" panose="02070309020205020404" pitchFamily="49" charset="0"/>
               </a:rPr>
               <a:t>addgroup</a:t>
             </a:r>
             <a:r>
-              <a:rPr lang="de-DE" sz="2400" dirty="0">
+              <a:rPr lang="de-DE" sz="2000" dirty="0">
                 <a:latin typeface="Courier New" panose="02070309020205020404" pitchFamily="49" charset="0"/>
                 <a:cs typeface="Courier New" panose="02070309020205020404" pitchFamily="49" charset="0"/>
               </a:rPr>
               <a:t> --system </a:t>
             </a:r>
             <a:r>
-              <a:rPr lang="de-DE" sz="2400" dirty="0" err="1">
+              <a:rPr lang="de-DE" sz="2000" dirty="0" err="1">
                 <a:latin typeface="Courier New" panose="02070309020205020404" pitchFamily="49" charset="0"/>
                 <a:cs typeface="Courier New" panose="02070309020205020404" pitchFamily="49" charset="0"/>
               </a:rPr>
               <a:t>docker</a:t>
             </a:r>
-            <a:endParaRPr lang="de-DE" sz="2400" dirty="0">
+            <a:endParaRPr lang="de-DE" sz="2000" dirty="0">
               <a:latin typeface="Courier New" panose="02070309020205020404" pitchFamily="49" charset="0"/>
               <a:cs typeface="Courier New" panose="02070309020205020404" pitchFamily="49" charset="0"/>
             </a:endParaRPr>
@@ -5924,48 +5969,48 @@
               <a:buNone/>
             </a:pPr>
             <a:r>
-              <a:rPr lang="de-DE" sz="2400" dirty="0">
+              <a:rPr lang="de-DE" sz="2000" dirty="0">
                 <a:latin typeface="Courier New" panose="02070309020205020404" pitchFamily="49" charset="0"/>
                 <a:cs typeface="Courier New" panose="02070309020205020404" pitchFamily="49" charset="0"/>
               </a:rPr>
               <a:t>	</a:t>
             </a:r>
             <a:r>
-              <a:rPr lang="de-DE" sz="2400" dirty="0" err="1">
+              <a:rPr lang="de-DE" sz="2000" dirty="0" err="1">
                 <a:latin typeface="Courier New" panose="02070309020205020404" pitchFamily="49" charset="0"/>
                 <a:cs typeface="Courier New" panose="02070309020205020404" pitchFamily="49" charset="0"/>
               </a:rPr>
               <a:t>sudo</a:t>
             </a:r>
             <a:r>
-              <a:rPr lang="de-DE" sz="2400" dirty="0">
+              <a:rPr lang="de-DE" sz="2000" dirty="0">
                 <a:latin typeface="Courier New" panose="02070309020205020404" pitchFamily="49" charset="0"/>
                 <a:cs typeface="Courier New" panose="02070309020205020404" pitchFamily="49" charset="0"/>
               </a:rPr>
               <a:t> </a:t>
             </a:r>
             <a:r>
-              <a:rPr lang="de-DE" sz="2400" dirty="0" err="1">
+              <a:rPr lang="de-DE" sz="2000" dirty="0" err="1">
                 <a:latin typeface="Courier New" panose="02070309020205020404" pitchFamily="49" charset="0"/>
                 <a:cs typeface="Courier New" panose="02070309020205020404" pitchFamily="49" charset="0"/>
               </a:rPr>
               <a:t>adduser</a:t>
             </a:r>
             <a:r>
-              <a:rPr lang="de-DE" sz="2400" dirty="0">
+              <a:rPr lang="de-DE" sz="2000" dirty="0">
                 <a:latin typeface="Courier New" panose="02070309020205020404" pitchFamily="49" charset="0"/>
                 <a:cs typeface="Courier New" panose="02070309020205020404" pitchFamily="49" charset="0"/>
               </a:rPr>
               <a:t> $USER </a:t>
             </a:r>
             <a:r>
-              <a:rPr lang="de-DE" sz="2400" dirty="0" err="1">
+              <a:rPr lang="de-DE" sz="2000" dirty="0" err="1">
                 <a:latin typeface="Courier New" panose="02070309020205020404" pitchFamily="49" charset="0"/>
                 <a:cs typeface="Courier New" panose="02070309020205020404" pitchFamily="49" charset="0"/>
               </a:rPr>
               <a:t>docker</a:t>
             </a:r>
-            <a:endParaRPr lang="de-DE" sz="2400" dirty="0">
+            <a:endParaRPr lang="de-DE" sz="2000" dirty="0">
               <a:latin typeface="Courier New" panose="02070309020205020404" pitchFamily="49" charset="0"/>
               <a:cs typeface="Courier New" panose="02070309020205020404" pitchFamily="49" charset="0"/>
             </a:endParaRPr>
@@ -5975,48 +6020,165 @@
               <a:buNone/>
             </a:pPr>
             <a:r>
-              <a:rPr lang="de-DE" sz="2400" dirty="0">
+              <a:rPr lang="de-DE" sz="2000" dirty="0">
                 <a:latin typeface="Courier New" panose="02070309020205020404" pitchFamily="49" charset="0"/>
                 <a:cs typeface="Courier New" panose="02070309020205020404" pitchFamily="49" charset="0"/>
               </a:rPr>
               <a:t>	</a:t>
             </a:r>
             <a:r>
-              <a:rPr lang="de-DE" sz="2400" dirty="0" err="1">
+              <a:rPr lang="de-DE" sz="2000" dirty="0" err="1">
                 <a:latin typeface="Courier New" panose="02070309020205020404" pitchFamily="49" charset="0"/>
                 <a:cs typeface="Courier New" panose="02070309020205020404" pitchFamily="49" charset="0"/>
               </a:rPr>
               <a:t>sudo</a:t>
             </a:r>
             <a:r>
-              <a:rPr lang="de-DE" sz="2400" dirty="0">
+              <a:rPr lang="de-DE" sz="2000" dirty="0">
                 <a:latin typeface="Courier New" panose="02070309020205020404" pitchFamily="49" charset="0"/>
                 <a:cs typeface="Courier New" panose="02070309020205020404" pitchFamily="49" charset="0"/>
               </a:rPr>
               <a:t> </a:t>
             </a:r>
             <a:r>
-              <a:rPr lang="de-DE" sz="2400" dirty="0" err="1">
+              <a:rPr lang="de-DE" sz="2000" dirty="0" err="1">
+                <a:latin typeface="Courier New" panose="02070309020205020404" pitchFamily="49" charset="0"/>
+                <a:cs typeface="Courier New" panose="02070309020205020404" pitchFamily="49" charset="0"/>
+              </a:rPr>
+              <a:t>docker</a:t>
+            </a:r>
+            <a:r>
+              <a:rPr lang="de-DE" sz="2000" dirty="0">
+                <a:latin typeface="Courier New" panose="02070309020205020404" pitchFamily="49" charset="0"/>
+                <a:cs typeface="Courier New" panose="02070309020205020404" pitchFamily="49" charset="0"/>
+              </a:rPr>
+              <a:t> pull </a:t>
+            </a:r>
+            <a:r>
+              <a:rPr lang="de-DE" sz="2000" dirty="0" err="1">
+                <a:latin typeface="Courier New" panose="02070309020205020404" pitchFamily="49" charset="0"/>
+                <a:cs typeface="Courier New" panose="02070309020205020404" pitchFamily="49" charset="0"/>
+              </a:rPr>
+              <a:t>quay.io</a:t>
+            </a:r>
+            <a:r>
+              <a:rPr lang="de-DE" sz="2000" dirty="0">
+                <a:latin typeface="Courier New" panose="02070309020205020404" pitchFamily="49" charset="0"/>
+                <a:cs typeface="Courier New" panose="02070309020205020404" pitchFamily="49" charset="0"/>
+              </a:rPr>
+              <a:t>/</a:t>
+            </a:r>
+            <a:r>
+              <a:rPr lang="de-DE" sz="2000" dirty="0" err="1">
+                <a:latin typeface="Courier New" panose="02070309020205020404" pitchFamily="49" charset="0"/>
+                <a:cs typeface="Courier New" panose="02070309020205020404" pitchFamily="49" charset="0"/>
+              </a:rPr>
+              <a:t>keycloak</a:t>
+            </a:r>
+            <a:r>
+              <a:rPr lang="de-DE" sz="2000" dirty="0">
+                <a:latin typeface="Courier New" panose="02070309020205020404" pitchFamily="49" charset="0"/>
+                <a:cs typeface="Courier New" panose="02070309020205020404" pitchFamily="49" charset="0"/>
+              </a:rPr>
+              <a:t>/keycloak:18.0.2-legacy</a:t>
+            </a:r>
+          </a:p>
+          <a:p>
+            <a:pPr marL="0" indent="0">
+              <a:buNone/>
+            </a:pPr>
+            <a:r>
+              <a:rPr lang="de-DE" sz="2000" dirty="0">
+                <a:latin typeface="Courier New" panose="02070309020205020404" pitchFamily="49" charset="0"/>
+                <a:cs typeface="Courier New" panose="02070309020205020404" pitchFamily="49" charset="0"/>
+              </a:rPr>
+              <a:t>	</a:t>
+            </a:r>
+            <a:r>
+              <a:rPr lang="de-DE" sz="2000" dirty="0" err="1">
+                <a:latin typeface="Courier New" panose="02070309020205020404" pitchFamily="49" charset="0"/>
+                <a:cs typeface="Courier New" panose="02070309020205020404" pitchFamily="49" charset="0"/>
+              </a:rPr>
+              <a:t>sudo</a:t>
+            </a:r>
+            <a:r>
+              <a:rPr lang="de-DE" sz="2000" dirty="0">
+                <a:latin typeface="Courier New" panose="02070309020205020404" pitchFamily="49" charset="0"/>
+                <a:cs typeface="Courier New" panose="02070309020205020404" pitchFamily="49" charset="0"/>
+              </a:rPr>
+              <a:t> </a:t>
+            </a:r>
+            <a:r>
+              <a:rPr lang="de-DE" sz="2000" dirty="0" err="1">
+                <a:latin typeface="Courier New" panose="02070309020205020404" pitchFamily="49" charset="0"/>
+                <a:cs typeface="Courier New" panose="02070309020205020404" pitchFamily="49" charset="0"/>
+              </a:rPr>
+              <a:t>docker</a:t>
+            </a:r>
+            <a:r>
+              <a:rPr lang="de-DE" sz="2000" dirty="0">
+                <a:latin typeface="Courier New" panose="02070309020205020404" pitchFamily="49" charset="0"/>
+                <a:cs typeface="Courier New" panose="02070309020205020404" pitchFamily="49" charset="0"/>
+              </a:rPr>
+              <a:t> pull postgres:15.1-bullseye</a:t>
+            </a:r>
+          </a:p>
+          <a:p>
+            <a:pPr marL="0" indent="0">
+              <a:buNone/>
+            </a:pPr>
+            <a:r>
+              <a:rPr lang="de-DE" sz="2000" dirty="0">
+                <a:latin typeface="Courier New" panose="02070309020205020404" pitchFamily="49" charset="0"/>
+                <a:cs typeface="Courier New" panose="02070309020205020404" pitchFamily="49" charset="0"/>
+              </a:rPr>
+              <a:t>	</a:t>
+            </a:r>
+            <a:r>
+              <a:rPr lang="de-DE" sz="2000" dirty="0" err="1">
+                <a:latin typeface="Courier New" panose="02070309020205020404" pitchFamily="49" charset="0"/>
+                <a:cs typeface="Courier New" panose="02070309020205020404" pitchFamily="49" charset="0"/>
+              </a:rPr>
+              <a:t>sudo</a:t>
+            </a:r>
+            <a:r>
+              <a:rPr lang="de-DE" sz="2000" dirty="0">
+                <a:latin typeface="Courier New" panose="02070309020205020404" pitchFamily="49" charset="0"/>
+                <a:cs typeface="Courier New" panose="02070309020205020404" pitchFamily="49" charset="0"/>
+              </a:rPr>
+              <a:t> </a:t>
+            </a:r>
+            <a:r>
+              <a:rPr lang="de-DE" sz="2000" dirty="0" err="1">
                 <a:latin typeface="Courier New" panose="02070309020205020404" pitchFamily="49" charset="0"/>
                 <a:cs typeface="Courier New" panose="02070309020205020404" pitchFamily="49" charset="0"/>
               </a:rPr>
               <a:t>shutdown</a:t>
             </a:r>
             <a:r>
-              <a:rPr lang="de-DE" sz="2400" dirty="0">
+              <a:rPr lang="de-DE" sz="2000" dirty="0">
                 <a:latin typeface="Courier New" panose="02070309020205020404" pitchFamily="49" charset="0"/>
                 <a:cs typeface="Courier New" panose="02070309020205020404" pitchFamily="49" charset="0"/>
               </a:rPr>
               <a:t> -h </a:t>
             </a:r>
             <a:r>
-              <a:rPr lang="de-DE" sz="2400" dirty="0" err="1">
+              <a:rPr lang="de-DE" sz="2000" dirty="0" err="1">
                 <a:latin typeface="Courier New" panose="02070309020205020404" pitchFamily="49" charset="0"/>
                 <a:cs typeface="Courier New" panose="02070309020205020404" pitchFamily="49" charset="0"/>
               </a:rPr>
               <a:t>now</a:t>
             </a:r>
-            <a:endParaRPr lang="de-DE" sz="2400" dirty="0">
+            <a:endParaRPr lang="de-DE" sz="2000" dirty="0">
+              <a:latin typeface="Courier New" panose="02070309020205020404" pitchFamily="49" charset="0"/>
+              <a:cs typeface="Courier New" panose="02070309020205020404" pitchFamily="49" charset="0"/>
+            </a:endParaRPr>
+          </a:p>
+          <a:p>
+            <a:pPr marL="0" indent="0">
+              <a:buNone/>
+            </a:pPr>
+            <a:endParaRPr lang="de-DE" sz="2000" dirty="0">
               <a:latin typeface="Courier New" panose="02070309020205020404" pitchFamily="49" charset="0"/>
               <a:cs typeface="Courier New" panose="02070309020205020404" pitchFamily="49" charset="0"/>
             </a:endParaRPr>

</xml_diff>